<commit_message>
Latest version second time
</commit_message>
<xml_diff>
--- a/PAC-final-presentation.pptx
+++ b/PAC-final-presentation.pptx
@@ -5035,16 +5035,7 @@
                 </a:solidFill>
                 <a:latin typeface="DIN Next LT Pro Condensed"/>
               </a:rPr>
-              <a:t>Development </a:t>
-            </a:r>
-            <a:r>
-              <a:rPr lang="en-US" sz="3600" dirty="0" smtClean="0">
-                <a:solidFill>
-                  <a:srgbClr val="383836"/>
-                </a:solidFill>
-                <a:latin typeface="DIN Next LT Pro Condensed"/>
-              </a:rPr>
-              <a:t>– Back-end service</a:t>
+              <a:t>Development – Back-end service</a:t>
             </a:r>
             <a:endParaRPr dirty="0"/>
           </a:p>
@@ -5137,11 +5128,7 @@
             </a:br>
             <a:r>
               <a:rPr lang="en-US" dirty="0"/>
-              <a:t>    </a:t>
-            </a:r>
-            <a:r>
-              <a:rPr lang="en-US" dirty="0"/>
-              <a:t>@</a:t>
+              <a:t>    @</a:t>
             </a:r>
             <a:r>
               <a:rPr lang="en-US" dirty="0" err="1"/>
@@ -5190,11 +5177,7 @@
             </a:br>
             <a:r>
               <a:rPr lang="en-US" dirty="0"/>
-              <a:t>    </a:t>
-            </a:r>
-            <a:r>
-              <a:rPr lang="en-US" dirty="0"/>
-              <a:t>@Override</a:t>
+              <a:t>    @Override</a:t>
             </a:r>
             <a:br>
               <a:rPr lang="en-US" dirty="0"/>
@@ -5302,11 +5285,7 @@
             </a:r>
             <a:r>
               <a:rPr lang="en-US" dirty="0" smtClean="0"/>
-              <a:t>} </a:t>
-            </a:r>
-            <a:r>
-              <a:rPr lang="en-US" dirty="0" smtClean="0"/>
-              <a:t>	</a:t>
+              <a:t>} 	</a:t>
             </a:r>
           </a:p>
           <a:p>
@@ -5419,12 +5398,12 @@
               <a:t>0 </a:t>
             </a:r>
             <a:r>
-              <a:rPr lang="en-US" dirty="0" err="1" smtClean="0"/>
-              <a:t>db</a:t>
-            </a:r>
-            <a:r>
               <a:rPr lang="en-US" dirty="0" smtClean="0"/>
-              <a:t> queries</a:t>
+              <a:t>DB </a:t>
+            </a:r>
+            <a:r>
+              <a:rPr lang="en-US" dirty="0" smtClean="0"/>
+              <a:t>queries</a:t>
             </a:r>
             <a:endParaRPr lang="en-US" dirty="0"/>
           </a:p>
@@ -5522,16 +5501,7 @@
                 </a:solidFill>
                 <a:latin typeface="DIN Next LT Pro Condensed"/>
               </a:rPr>
-              <a:t>Development </a:t>
-            </a:r>
-            <a:r>
-              <a:rPr lang="en-US" sz="3600" dirty="0" smtClean="0">
-                <a:solidFill>
-                  <a:srgbClr val="383836"/>
-                </a:solidFill>
-                <a:latin typeface="DIN Next LT Pro Condensed"/>
-              </a:rPr>
-              <a:t>– Back-end model</a:t>
+              <a:t>Development – Back-end model</a:t>
             </a:r>
             <a:endParaRPr dirty="0"/>
           </a:p>
@@ -6390,7 +6360,7 @@
         </p:nvSpPr>
         <p:spPr>
           <a:xfrm>
-            <a:off x="4611684" y="3649588"/>
+            <a:off x="4652334" y="3289548"/>
             <a:ext cx="4361656" cy="980782"/>
           </a:xfrm>
           <a:prstGeom prst="cloud">
@@ -6426,11 +6396,7 @@
             </a:r>
             <a:r>
               <a:rPr lang="en-US" dirty="0" smtClean="0"/>
-              <a:t> setup as in </a:t>
-            </a:r>
-            <a:r>
-              <a:rPr lang="en-US" dirty="0" smtClean="0"/>
-              <a:t>production / vagrant</a:t>
+              <a:t> setup as in production / vagrant</a:t>
             </a:r>
             <a:endParaRPr lang="en-US" dirty="0"/>
           </a:p>
@@ -6908,7 +6874,7 @@
         </p:nvSpPr>
         <p:spPr>
           <a:xfrm>
-            <a:off x="2843808" y="732304"/>
+            <a:off x="3059832" y="732304"/>
             <a:ext cx="3960440" cy="757044"/>
           </a:xfrm>
           <a:prstGeom prst="cloud">
@@ -6950,7 +6916,7 @@
         </p:nvSpPr>
         <p:spPr>
           <a:xfrm>
-            <a:off x="3635896" y="2443934"/>
+            <a:off x="3851920" y="2443934"/>
             <a:ext cx="2304256" cy="413566"/>
           </a:xfrm>
           <a:prstGeom prst="cloud">
@@ -8006,7 +7972,7 @@
                 </a:solidFill>
                 <a:latin typeface="DIN Next LT Pro Condensed"/>
               </a:rPr>
-              <a:t>Making release</a:t>
+              <a:t>Release</a:t>
             </a:r>
             <a:endParaRPr dirty="0"/>
           </a:p>
@@ -8446,8 +8412,12 @@
               <a:buChar char="ü"/>
             </a:pPr>
             <a:r>
+              <a:rPr lang="en-US" sz="2400" b="1" dirty="0" smtClean="0"/>
+              <a:t>Nexus</a:t>
+            </a:r>
+            <a:r>
               <a:rPr lang="en-US" sz="2400" dirty="0" smtClean="0"/>
-              <a:t>Nexus keeps history of all released versions</a:t>
+              <a:t> keeps history of all released versions</a:t>
             </a:r>
           </a:p>
           <a:p>
@@ -8460,8 +8430,12 @@
               <a:buChar char="ü"/>
             </a:pPr>
             <a:r>
+              <a:rPr lang="en-US" sz="2400" b="1" dirty="0" smtClean="0"/>
+              <a:t>DML</a:t>
+            </a:r>
+            <a:r>
               <a:rPr lang="en-US" sz="2400" dirty="0" smtClean="0"/>
-              <a:t>DML – contract with system administrators - structure always stays the same</a:t>
+              <a:t> – contract with system administrators - structure always stays the same</a:t>
             </a:r>
           </a:p>
           <a:p>
@@ -8474,8 +8448,16 @@
               <a:buChar char="ü"/>
             </a:pPr>
             <a:r>
+              <a:rPr lang="en-US" sz="2400" b="1" dirty="0" smtClean="0"/>
+              <a:t>Configuration</a:t>
+            </a:r>
+            <a:r>
               <a:rPr lang="en-US" sz="2400" dirty="0" smtClean="0"/>
-              <a:t>Configuration files for each stage (D, Q, P) kept on relative servers, respectively </a:t>
+              <a:t> files for each stage (D, Q, P) kept on </a:t>
+            </a:r>
+            <a:r>
+              <a:rPr lang="en-US" sz="2400" dirty="0" smtClean="0"/>
+              <a:t>respective servers</a:t>
             </a:r>
             <a:endParaRPr lang="en-US" sz="2400" dirty="0"/>
           </a:p>
@@ -9125,17 +9107,8 @@
             </a:pPr>
             <a:r>
               <a:rPr lang="en-US" sz="2400" dirty="0" smtClean="0"/>
-              <a:t>Super-easy </a:t>
-            </a:r>
-            <a:r>
-              <a:rPr lang="en-US" sz="2400" dirty="0" smtClean="0"/>
-              <a:t>project </a:t>
-            </a:r>
-            <a:r>
-              <a:rPr lang="en-US" sz="2400" dirty="0" smtClean="0"/>
-              <a:t>setup, easy to jump-in</a:t>
-            </a:r>
-            <a:endParaRPr lang="en-US" sz="2400" dirty="0" smtClean="0"/>
+              <a:t>Super-easy project setup, easy to jump-in</a:t>
+            </a:r>
           </a:p>
           <a:p>
             <a:pPr marL="457200" indent="-457200">
@@ -9148,11 +9121,7 @@
             </a:pPr>
             <a:r>
               <a:rPr lang="en-US" sz="2400" dirty="0" smtClean="0"/>
-              <a:t>Team coaching, know-how transfer, </a:t>
-            </a:r>
-            <a:r>
-              <a:rPr lang="en-US" sz="2400" dirty="0" smtClean="0"/>
-              <a:t>workshops</a:t>
+              <a:t>Team coaching, know-how transfer, workshops</a:t>
             </a:r>
           </a:p>
           <a:p>
@@ -9168,7 +9137,6 @@
               <a:rPr lang="en-US" sz="2400" dirty="0" smtClean="0"/>
               <a:t>Keep it simple</a:t>
             </a:r>
-            <a:endParaRPr lang="en-US" sz="2400" dirty="0" smtClean="0"/>
           </a:p>
         </p:txBody>
       </p:sp>
@@ -9330,7 +9298,6 @@
               <a:rPr lang="en-US" sz="2400" dirty="0" smtClean="0"/>
               <a:t>simple</a:t>
             </a:r>
-            <a:endParaRPr lang="en-US" sz="2400" dirty="0" smtClean="0"/>
           </a:p>
           <a:p>
             <a:pPr marL="457200" indent="-457200">
@@ -9371,7 +9338,6 @@
               <a:rPr lang="en-US" sz="2400" dirty="0" smtClean="0"/>
               <a:t>market</a:t>
             </a:r>
-            <a:endParaRPr lang="en-US" sz="2400" dirty="0" smtClean="0"/>
           </a:p>
           <a:p>
             <a:pPr marL="457200" indent="-457200">
@@ -9594,19 +9560,7 @@
               <a:rPr lang="en-US" sz="3000" dirty="0" smtClean="0">
                 <a:latin typeface="DIN Next LT Pro Condensed"/>
               </a:rPr>
-              <a:t>votes / Add or </a:t>
-            </a:r>
-            <a:r>
-              <a:rPr lang="en-US" sz="3000" dirty="0" smtClean="0">
-                <a:latin typeface="DIN Next LT Pro Condensed"/>
-              </a:rPr>
-              <a:t>edit/delete </a:t>
-            </a:r>
-            <a:r>
-              <a:rPr lang="en-US" sz="3000" dirty="0" smtClean="0">
-                <a:latin typeface="DIN Next LT Pro Condensed"/>
-              </a:rPr>
-              <a:t>own votes</a:t>
+              <a:t>votes / Add or edit/delete own votes</a:t>
             </a:r>
             <a:endParaRPr sz="3000" dirty="0"/>
           </a:p>
@@ -9933,7 +9887,7 @@
                 <a:latin typeface="DIN Next LT Pro Condensed"/>
                 <a:sym typeface="Wingdings" panose="05000000000000000000" pitchFamily="2" charset="2"/>
               </a:rPr>
-              <a:t>JSON </a:t>
+              <a:t>Nginx Load balancer, JSON </a:t>
             </a:r>
             <a:r>
               <a:rPr lang="en-US" sz="1900" dirty="0" smtClean="0">
@@ -9953,13 +9907,8 @@
                 <a:latin typeface="DIN Next LT Pro Condensed"/>
                 <a:sym typeface="Wingdings" panose="05000000000000000000" pitchFamily="2" charset="2"/>
               </a:rPr>
-              <a:t>load (cluster)</a:t>
-            </a:r>
-            <a:endParaRPr lang="en-US" sz="1900" dirty="0">
-              <a:solidFill>
-                <a:srgbClr val="92D050"/>
-              </a:solidFill>
-            </a:endParaRPr>
+              <a:t>load</a:t>
+            </a:r>
           </a:p>
           <a:p>
             <a:pPr marL="457200" indent="-457200">
@@ -9970,6 +9919,15 @@
               <a:buFont typeface="Wingdings" panose="05000000000000000000" pitchFamily="2" charset="2"/>
               <a:buChar char="ü"/>
             </a:pPr>
+            <a:r>
+              <a:rPr lang="en-US" sz="1900" dirty="0" smtClean="0">
+                <a:solidFill>
+                  <a:srgbClr val="383836"/>
+                </a:solidFill>
+                <a:latin typeface="DIN Next LT Pro Condensed"/>
+              </a:rPr>
+              <a:t>High </a:t>
+            </a:r>
             <a:r>
               <a:rPr lang="en-US" sz="1900" dirty="0">
                 <a:solidFill>
@@ -9977,7 +9935,7 @@
                 </a:solidFill>
                 <a:latin typeface="DIN Next LT Pro Condensed"/>
               </a:rPr>
-              <a:t>High availability (</a:t>
+              <a:t>availability (</a:t>
             </a:r>
             <a:r>
               <a:rPr lang="en-US" sz="1900" dirty="0">
@@ -10141,17 +10099,7 @@
                 <a:latin typeface="DIN Next LT Pro Condensed"/>
                 <a:sym typeface="Wingdings" panose="05000000000000000000" pitchFamily="2" charset="2"/>
               </a:rPr>
-              <a:t> everything needed to run the </a:t>
-            </a:r>
-            <a:r>
-              <a:rPr lang="en-US" sz="1900" dirty="0" smtClean="0">
-                <a:solidFill>
-                  <a:srgbClr val="92D050"/>
-                </a:solidFill>
-                <a:latin typeface="DIN Next LT Pro Condensed"/>
-                <a:sym typeface="Wingdings" panose="05000000000000000000" pitchFamily="2" charset="2"/>
-              </a:rPr>
-              <a:t>application, output of </a:t>
+              <a:t> everything needed to run the application, output of </a:t>
             </a:r>
             <a:r>
               <a:rPr lang="en-US" sz="1900" dirty="0" err="1" smtClean="0">
@@ -10919,21 +10867,22 @@
             <a:pPr algn="ctr"/>
             <a:r>
               <a:rPr lang="en-US" dirty="0" smtClean="0"/>
-              <a:t>No near future migration costs</a:t>
+              <a:t>No near future migration </a:t>
+            </a:r>
+            <a:r>
+              <a:rPr lang="en-US" dirty="0" smtClean="0"/>
+              <a:t>costs</a:t>
             </a:r>
           </a:p>
           <a:p>
             <a:pPr algn="ctr"/>
             <a:r>
               <a:rPr lang="en-US" dirty="0" smtClean="0"/>
-              <a:t>Allow growth (scalable)</a:t>
-            </a:r>
-          </a:p>
-          <a:p>
-            <a:pPr algn="ctr"/>
+              <a:t>No </a:t>
+            </a:r>
             <a:r>
               <a:rPr lang="en-US" dirty="0" smtClean="0"/>
-              <a:t>No reinventing the wheel</a:t>
+              <a:t>reinventing the wheel</a:t>
             </a:r>
             <a:endParaRPr lang="en-US" dirty="0"/>
           </a:p>
@@ -11343,13 +11292,8 @@
             </a:pPr>
             <a:r>
               <a:rPr lang="en-US" sz="2400" dirty="0" smtClean="0"/>
-              <a:t>Agile / convention over </a:t>
-            </a:r>
-            <a:r>
-              <a:rPr lang="en-US" sz="2400" dirty="0" smtClean="0"/>
-              <a:t>configuration</a:t>
-            </a:r>
-            <a:endParaRPr lang="en-US" sz="2400" dirty="0" smtClean="0"/>
+              <a:t>Agile / convention over configuration</a:t>
+            </a:r>
           </a:p>
           <a:p>
             <a:pPr marL="457200" indent="-457200">
@@ -11362,11 +11306,7 @@
             </a:pPr>
             <a:r>
               <a:rPr lang="en-US" sz="2400" dirty="0" smtClean="0"/>
-              <a:t>Project tooling</a:t>
-            </a:r>
-            <a:r>
-              <a:rPr lang="en-US" sz="2400" dirty="0" smtClean="0"/>
-              <a:t>: </a:t>
+              <a:t>Project tooling: </a:t>
             </a:r>
             <a:r>
               <a:rPr lang="en-US" sz="2400" dirty="0" err="1" smtClean="0"/>
@@ -11374,13 +11314,8 @@
             </a:r>
             <a:r>
               <a:rPr lang="en-US" sz="2400" dirty="0" smtClean="0"/>
-              <a:t> Stack (Jira, Confluence, Crucible</a:t>
-            </a:r>
-            <a:r>
-              <a:rPr lang="en-US" sz="2400" dirty="0" smtClean="0"/>
-              <a:t>)</a:t>
-            </a:r>
-            <a:endParaRPr lang="en-US" sz="2400" dirty="0" smtClean="0"/>
+              <a:t> Stack (Jira, Confluence, Crucible)</a:t>
+            </a:r>
           </a:p>
           <a:p>
             <a:pPr marL="457200" indent="-457200">
@@ -11393,13 +11328,8 @@
             </a:pPr>
             <a:r>
               <a:rPr lang="en-US" sz="2400" dirty="0" smtClean="0"/>
-              <a:t>Independent back-end and front-end </a:t>
-            </a:r>
-            <a:r>
-              <a:rPr lang="en-US" sz="2400" dirty="0" smtClean="0"/>
-              <a:t>projects</a:t>
-            </a:r>
-            <a:endParaRPr lang="en-US" sz="2400" dirty="0" smtClean="0"/>
+              <a:t>Independent back-end and front-end projects</a:t>
+            </a:r>
           </a:p>
           <a:p>
             <a:pPr marL="457200" indent="-457200">

</xml_diff>